<commit_message>
fix: dashboard pdf export, ppt file, dashboard overview image error
</commit_message>
<xml_diff>
--- a/netflix-shows/docs/Netflix_Dashboard_Guide.pptx
+++ b/netflix-shows/docs/Netflix_Dashboard_Guide.pptx
@@ -6,12 +6,11 @@
   </p:sldMasterIdLst>
   <p:sldIdLst>
     <p:sldId id="256" r:id="rId2"/>
-    <p:sldId id="262" r:id="rId3"/>
-    <p:sldId id="263" r:id="rId4"/>
-    <p:sldId id="264" r:id="rId5"/>
-    <p:sldId id="265" r:id="rId6"/>
-    <p:sldId id="261" r:id="rId7"/>
-    <p:sldId id="266" r:id="rId8"/>
+    <p:sldId id="267" r:id="rId3"/>
+    <p:sldId id="262" r:id="rId4"/>
+    <p:sldId id="268" r:id="rId5"/>
+    <p:sldId id="269" r:id="rId6"/>
+    <p:sldId id="266" r:id="rId7"/>
   </p:sldIdLst>
   <p:sldSz cx="12192000" cy="6858000"/>
   <p:notesSz cx="6858000" cy="9144000"/>
@@ -303,7 +302,7 @@
           <a:p>
             <a:fld id="{84E633C6-B3A5-4CD0-9756-A614F40A934F}" type="datetimeFigureOut">
               <a:rPr lang="en-ID" smtClean="0"/>
-              <a:t>30/07/2025</a:t>
+              <a:t>08/08/2025</a:t>
             </a:fld>
             <a:endParaRPr lang="en-ID"/>
           </a:p>
@@ -601,7 +600,7 @@
           <a:p>
             <a:fld id="{84E633C6-B3A5-4CD0-9756-A614F40A934F}" type="datetimeFigureOut">
               <a:rPr lang="en-ID" smtClean="0"/>
-              <a:t>30/07/2025</a:t>
+              <a:t>08/08/2025</a:t>
             </a:fld>
             <a:endParaRPr lang="en-ID"/>
           </a:p>
@@ -793,7 +792,7 @@
           <a:p>
             <a:fld id="{84E633C6-B3A5-4CD0-9756-A614F40A934F}" type="datetimeFigureOut">
               <a:rPr lang="en-ID" smtClean="0"/>
-              <a:t>30/07/2025</a:t>
+              <a:t>08/08/2025</a:t>
             </a:fld>
             <a:endParaRPr lang="en-ID"/>
           </a:p>
@@ -1054,7 +1053,7 @@
           <a:p>
             <a:fld id="{84E633C6-B3A5-4CD0-9756-A614F40A934F}" type="datetimeFigureOut">
               <a:rPr lang="en-ID" smtClean="0"/>
-              <a:t>30/07/2025</a:t>
+              <a:t>08/08/2025</a:t>
             </a:fld>
             <a:endParaRPr lang="en-ID"/>
           </a:p>
@@ -1478,7 +1477,7 @@
           <a:p>
             <a:fld id="{84E633C6-B3A5-4CD0-9756-A614F40A934F}" type="datetimeFigureOut">
               <a:rPr lang="en-ID" smtClean="0"/>
-              <a:t>30/07/2025</a:t>
+              <a:t>08/08/2025</a:t>
             </a:fld>
             <a:endParaRPr lang="en-ID"/>
           </a:p>
@@ -2015,7 +2014,7 @@
           <a:p>
             <a:fld id="{84E633C6-B3A5-4CD0-9756-A614F40A934F}" type="datetimeFigureOut">
               <a:rPr lang="en-ID" smtClean="0"/>
-              <a:t>30/07/2025</a:t>
+              <a:t>08/08/2025</a:t>
             </a:fld>
             <a:endParaRPr lang="en-ID"/>
           </a:p>
@@ -2879,7 +2878,7 @@
           <a:p>
             <a:fld id="{84E633C6-B3A5-4CD0-9756-A614F40A934F}" type="datetimeFigureOut">
               <a:rPr lang="en-ID" smtClean="0"/>
-              <a:t>30/07/2025</a:t>
+              <a:t>08/08/2025</a:t>
             </a:fld>
             <a:endParaRPr lang="en-ID"/>
           </a:p>
@@ -3049,7 +3048,7 @@
           <a:p>
             <a:fld id="{84E633C6-B3A5-4CD0-9756-A614F40A934F}" type="datetimeFigureOut">
               <a:rPr lang="en-ID" smtClean="0"/>
-              <a:t>30/07/2025</a:t>
+              <a:t>08/08/2025</a:t>
             </a:fld>
             <a:endParaRPr lang="en-ID"/>
           </a:p>
@@ -3233,7 +3232,7 @@
           <a:p>
             <a:fld id="{84E633C6-B3A5-4CD0-9756-A614F40A934F}" type="datetimeFigureOut">
               <a:rPr lang="en-ID" smtClean="0"/>
-              <a:t>30/07/2025</a:t>
+              <a:t>08/08/2025</a:t>
             </a:fld>
             <a:endParaRPr lang="en-ID"/>
           </a:p>
@@ -3403,7 +3402,7 @@
           <a:p>
             <a:fld id="{84E633C6-B3A5-4CD0-9756-A614F40A934F}" type="datetimeFigureOut">
               <a:rPr lang="en-ID" smtClean="0"/>
-              <a:t>30/07/2025</a:t>
+              <a:t>08/08/2025</a:t>
             </a:fld>
             <a:endParaRPr lang="en-ID"/>
           </a:p>
@@ -3647,7 +3646,7 @@
           <a:p>
             <a:fld id="{84E633C6-B3A5-4CD0-9756-A614F40A934F}" type="datetimeFigureOut">
               <a:rPr lang="en-ID" smtClean="0"/>
-              <a:t>30/07/2025</a:t>
+              <a:t>08/08/2025</a:t>
             </a:fld>
             <a:endParaRPr lang="en-ID"/>
           </a:p>
@@ -3883,7 +3882,7 @@
           <a:p>
             <a:fld id="{84E633C6-B3A5-4CD0-9756-A614F40A934F}" type="datetimeFigureOut">
               <a:rPr lang="en-ID" smtClean="0"/>
-              <a:t>30/07/2025</a:t>
+              <a:t>08/08/2025</a:t>
             </a:fld>
             <a:endParaRPr lang="en-ID"/>
           </a:p>
@@ -4349,7 +4348,7 @@
           <a:p>
             <a:fld id="{84E633C6-B3A5-4CD0-9756-A614F40A934F}" type="datetimeFigureOut">
               <a:rPr lang="en-ID" smtClean="0"/>
-              <a:t>30/07/2025</a:t>
+              <a:t>08/08/2025</a:t>
             </a:fld>
             <a:endParaRPr lang="en-ID"/>
           </a:p>
@@ -4467,7 +4466,7 @@
           <a:p>
             <a:fld id="{84E633C6-B3A5-4CD0-9756-A614F40A934F}" type="datetimeFigureOut">
               <a:rPr lang="en-ID" smtClean="0"/>
-              <a:t>30/07/2025</a:t>
+              <a:t>08/08/2025</a:t>
             </a:fld>
             <a:endParaRPr lang="en-ID"/>
           </a:p>
@@ -4562,7 +4561,7 @@
           <a:p>
             <a:fld id="{84E633C6-B3A5-4CD0-9756-A614F40A934F}" type="datetimeFigureOut">
               <a:rPr lang="en-ID" smtClean="0"/>
-              <a:t>30/07/2025</a:t>
+              <a:t>08/08/2025</a:t>
             </a:fld>
             <a:endParaRPr lang="en-ID"/>
           </a:p>
@@ -4817,7 +4816,7 @@
           <a:p>
             <a:fld id="{84E633C6-B3A5-4CD0-9756-A614F40A934F}" type="datetimeFigureOut">
               <a:rPr lang="en-ID" smtClean="0"/>
-              <a:t>30/07/2025</a:t>
+              <a:t>08/08/2025</a:t>
             </a:fld>
             <a:endParaRPr lang="en-ID"/>
           </a:p>
@@ -5117,7 +5116,7 @@
           <a:p>
             <a:fld id="{84E633C6-B3A5-4CD0-9756-A614F40A934F}" type="datetimeFigureOut">
               <a:rPr lang="en-ID" smtClean="0"/>
-              <a:t>30/07/2025</a:t>
+              <a:t>08/08/2025</a:t>
             </a:fld>
             <a:endParaRPr lang="en-ID"/>
           </a:p>
@@ -5351,7 +5350,7 @@
           <a:p>
             <a:fld id="{84E633C6-B3A5-4CD0-9756-A614F40A934F}" type="datetimeFigureOut">
               <a:rPr lang="en-ID" smtClean="0"/>
-              <a:t>30/07/2025</a:t>
+              <a:t>08/08/2025</a:t>
             </a:fld>
             <a:endParaRPr lang="en-ID"/>
           </a:p>
@@ -6199,10 +6198,10 @@
       </p:grpSpPr>
       <p:pic>
         <p:nvPicPr>
-          <p:cNvPr id="3" name="Picture 2">
+          <p:cNvPr id="4" name="Picture 3">
             <a:extLst>
               <a:ext uri="{FF2B5EF4-FFF2-40B4-BE49-F238E27FC236}">
-                <a16:creationId xmlns:a16="http://schemas.microsoft.com/office/drawing/2014/main" id="{659D83BC-164D-41A5-8997-251E587C039B}"/>
+                <a16:creationId xmlns:a16="http://schemas.microsoft.com/office/drawing/2014/main" id="{ADBB1C1F-0564-4C13-BFFA-34BC9EAB7359}"/>
               </a:ext>
             </a:extLst>
           </p:cNvPr>
@@ -6225,8 +6224,8 @@
         </p:blipFill>
         <p:spPr>
           <a:xfrm>
-            <a:off x="-1" y="0"/>
-            <a:ext cx="12192001" cy="6858000"/>
+            <a:off x="0" y="0"/>
+            <a:ext cx="12191999" cy="6858000"/>
           </a:xfrm>
           <a:prstGeom prst="rect">
             <a:avLst/>
@@ -6236,7 +6235,7 @@
     </p:spTree>
     <p:extLst>
       <p:ext uri="{BB962C8B-B14F-4D97-AF65-F5344CB8AC3E}">
-        <p14:creationId xmlns:p14="http://schemas.microsoft.com/office/powerpoint/2010/main" val="2082310184"/>
+        <p14:creationId xmlns:p14="http://schemas.microsoft.com/office/powerpoint/2010/main" val="1052705855"/>
       </p:ext>
     </p:extLst>
   </p:cSld>
@@ -6265,10 +6264,10 @@
       </p:grpSpPr>
       <p:pic>
         <p:nvPicPr>
-          <p:cNvPr id="3" name="Picture 2">
+          <p:cNvPr id="4" name="Picture 3">
             <a:extLst>
               <a:ext uri="{FF2B5EF4-FFF2-40B4-BE49-F238E27FC236}">
-                <a16:creationId xmlns:a16="http://schemas.microsoft.com/office/drawing/2014/main" id="{659D83BC-164D-41A5-8997-251E587C039B}"/>
+                <a16:creationId xmlns:a16="http://schemas.microsoft.com/office/drawing/2014/main" id="{ADBB1C1F-0564-4C13-BFFA-34BC9EAB7359}"/>
               </a:ext>
             </a:extLst>
           </p:cNvPr>
@@ -6291,8 +6290,8 @@
         </p:blipFill>
         <p:spPr>
           <a:xfrm>
-            <a:off x="-1" y="0"/>
-            <a:ext cx="12192001" cy="6858000"/>
+            <a:off x="0" y="0"/>
+            <a:ext cx="12191999" cy="6858000"/>
           </a:xfrm>
           <a:prstGeom prst="rect">
             <a:avLst/>
@@ -6301,10 +6300,10 @@
       </p:pic>
       <p:sp>
         <p:nvSpPr>
-          <p:cNvPr id="4" name="Rectangle 3">
+          <p:cNvPr id="5" name="Rectangle 4">
             <a:extLst>
               <a:ext uri="{FF2B5EF4-FFF2-40B4-BE49-F238E27FC236}">
-                <a16:creationId xmlns:a16="http://schemas.microsoft.com/office/drawing/2014/main" id="{A33F327E-88AB-4667-BF1A-330F1635AE62}"/>
+                <a16:creationId xmlns:a16="http://schemas.microsoft.com/office/drawing/2014/main" id="{D3BB2CF5-B71A-40F0-A9A0-56F96D425993}"/>
               </a:ext>
             </a:extLst>
           </p:cNvPr>
@@ -6313,8 +6312,8 @@
         </p:nvSpPr>
         <p:spPr>
           <a:xfrm>
-            <a:off x="1812171" y="217714"/>
-            <a:ext cx="10162115" cy="6433457"/>
+            <a:off x="220273" y="209774"/>
+            <a:ext cx="11752988" cy="852551"/>
           </a:xfrm>
           <a:prstGeom prst="rect">
             <a:avLst/>
@@ -6349,16 +6348,16 @@
           <a:lstStyle/>
           <a:p>
             <a:pPr algn="ctr"/>
-            <a:endParaRPr lang="en-ID"/>
-          </a:p>
-        </p:txBody>
-      </p:sp>
-      <p:sp>
-        <p:nvSpPr>
-          <p:cNvPr id="5" name="Rectangle 4">
+            <a:endParaRPr lang="en-ID" dirty="0"/>
+          </a:p>
+        </p:txBody>
+      </p:sp>
+      <p:sp>
+        <p:nvSpPr>
+          <p:cNvPr id="6" name="Rectangle 5">
             <a:extLst>
               <a:ext uri="{FF2B5EF4-FFF2-40B4-BE49-F238E27FC236}">
-                <a16:creationId xmlns:a16="http://schemas.microsoft.com/office/drawing/2014/main" id="{C8F5DFDE-63D2-4FCF-98B3-390157B876FC}"/>
+                <a16:creationId xmlns:a16="http://schemas.microsoft.com/office/drawing/2014/main" id="{8607C15A-3284-4698-A488-021484AF6161}"/>
               </a:ext>
             </a:extLst>
           </p:cNvPr>
@@ -6367,8 +6366,8 @@
         </p:nvSpPr>
         <p:spPr>
           <a:xfrm>
-            <a:off x="217714" y="217714"/>
-            <a:ext cx="1654628" cy="849086"/>
+            <a:off x="220273" y="2086984"/>
+            <a:ext cx="1611130" cy="4550484"/>
           </a:xfrm>
           <a:prstGeom prst="rect">
             <a:avLst/>
@@ -6407,54 +6406,12 @@
           </a:p>
         </p:txBody>
       </p:sp>
-      <p:cxnSp>
-        <p:nvCxnSpPr>
-          <p:cNvPr id="6" name="Straight Arrow Connector 5">
-            <a:extLst>
-              <a:ext uri="{FF2B5EF4-FFF2-40B4-BE49-F238E27FC236}">
-                <a16:creationId xmlns:a16="http://schemas.microsoft.com/office/drawing/2014/main" id="{31D65F82-E036-4041-A737-CDE94E94CFDB}"/>
-              </a:ext>
-            </a:extLst>
-          </p:cNvPr>
-          <p:cNvCxnSpPr>
-            <a:cxnSpLocks/>
-          </p:cNvCxnSpPr>
-          <p:nvPr/>
-        </p:nvCxnSpPr>
-        <p:spPr>
-          <a:xfrm>
-            <a:off x="1812171" y="1594573"/>
-            <a:ext cx="3082558" cy="1215862"/>
-          </a:xfrm>
-          <a:prstGeom prst="straightConnector1">
-            <a:avLst/>
-          </a:prstGeom>
-          <a:ln w="38100">
-            <a:headEnd type="triangle"/>
-            <a:tailEnd type="triangle"/>
-          </a:ln>
-        </p:spPr>
-        <p:style>
-          <a:lnRef idx="1">
-            <a:schemeClr val="dk1"/>
-          </a:lnRef>
-          <a:fillRef idx="0">
-            <a:schemeClr val="dk1"/>
-          </a:fillRef>
-          <a:effectRef idx="0">
-            <a:schemeClr val="dk1"/>
-          </a:effectRef>
-          <a:fontRef idx="minor">
-            <a:schemeClr val="tx1"/>
-          </a:fontRef>
-        </p:style>
-      </p:cxnSp>
       <p:sp>
         <p:nvSpPr>
           <p:cNvPr id="7" name="Rectangle 6">
             <a:extLst>
               <a:ext uri="{FF2B5EF4-FFF2-40B4-BE49-F238E27FC236}">
-                <a16:creationId xmlns:a16="http://schemas.microsoft.com/office/drawing/2014/main" id="{83C87B7F-539A-4079-BA01-0128AEBE7482}"/>
+                <a16:creationId xmlns:a16="http://schemas.microsoft.com/office/drawing/2014/main" id="{9FFD2395-C5FA-43D8-9A0E-98F3D892E88A}"/>
               </a:ext>
             </a:extLst>
           </p:cNvPr>
@@ -6463,8 +6420,8 @@
         </p:nvSpPr>
         <p:spPr>
           <a:xfrm>
-            <a:off x="217713" y="2038189"/>
-            <a:ext cx="1654629" cy="4612969"/>
+            <a:off x="1831403" y="1062325"/>
+            <a:ext cx="10140324" cy="5591664"/>
           </a:xfrm>
           <a:prstGeom prst="rect">
             <a:avLst/>
@@ -6499,16 +6456,58 @@
           <a:lstStyle/>
           <a:p>
             <a:pPr algn="ctr"/>
-            <a:endParaRPr lang="en-ID" dirty="0"/>
-          </a:p>
-        </p:txBody>
-      </p:sp>
+            <a:endParaRPr lang="en-ID"/>
+          </a:p>
+        </p:txBody>
+      </p:sp>
+      <p:cxnSp>
+        <p:nvCxnSpPr>
+          <p:cNvPr id="8" name="Straight Arrow Connector 7">
+            <a:extLst>
+              <a:ext uri="{FF2B5EF4-FFF2-40B4-BE49-F238E27FC236}">
+                <a16:creationId xmlns:a16="http://schemas.microsoft.com/office/drawing/2014/main" id="{57FCEC74-DA8F-4D89-8CCB-A938F34DAEB8}"/>
+              </a:ext>
+            </a:extLst>
+          </p:cNvPr>
+          <p:cNvCxnSpPr>
+            <a:cxnSpLocks/>
+          </p:cNvCxnSpPr>
+          <p:nvPr/>
+        </p:nvCxnSpPr>
+        <p:spPr>
+          <a:xfrm>
+            <a:off x="1829869" y="1493370"/>
+            <a:ext cx="3082558" cy="1215862"/>
+          </a:xfrm>
+          <a:prstGeom prst="straightConnector1">
+            <a:avLst/>
+          </a:prstGeom>
+          <a:ln w="38100">
+            <a:headEnd type="triangle"/>
+            <a:tailEnd type="triangle"/>
+          </a:ln>
+        </p:spPr>
+        <p:style>
+          <a:lnRef idx="1">
+            <a:schemeClr val="dk1"/>
+          </a:lnRef>
+          <a:fillRef idx="0">
+            <a:schemeClr val="dk1"/>
+          </a:fillRef>
+          <a:effectRef idx="0">
+            <a:schemeClr val="dk1"/>
+          </a:effectRef>
+          <a:fontRef idx="minor">
+            <a:schemeClr val="tx1"/>
+          </a:fontRef>
+        </p:style>
+      </p:cxnSp>
       <p:pic>
         <p:nvPicPr>
-          <p:cNvPr id="8" name="Picture 7">
+          <p:cNvPr id="9" name="Picture 8">
             <a:extLst>
               <a:ext uri="{FF2B5EF4-FFF2-40B4-BE49-F238E27FC236}">
-                <a16:creationId xmlns:a16="http://schemas.microsoft.com/office/drawing/2014/main" id="{0E29AC05-428C-4974-8D69-A738E7F41E85}"/>
+                <a16:creationId xmlns:a16="http://schemas.microsoft.com/office/drawing/2014/main" id="{EF8BD0F2-7A4D-4CFF-8B5F-652795BAAF6C}"/>
               </a:ext>
             </a:extLst>
           </p:cNvPr>
@@ -6525,7 +6524,7 @@
         </p:blipFill>
         <p:spPr>
           <a:xfrm>
-            <a:off x="4972210" y="2016079"/>
+            <a:off x="4912427" y="1973072"/>
             <a:ext cx="2707522" cy="1588711"/>
           </a:xfrm>
           <a:prstGeom prst="rect">
@@ -6533,58 +6532,10 @@
           </a:prstGeom>
         </p:spPr>
       </p:pic>
-      <p:sp>
-        <p:nvSpPr>
-          <p:cNvPr id="9" name="TextBox 8">
-            <a:extLst>
-              <a:ext uri="{FF2B5EF4-FFF2-40B4-BE49-F238E27FC236}">
-                <a16:creationId xmlns:a16="http://schemas.microsoft.com/office/drawing/2014/main" id="{2D487225-463F-4A90-9662-2EFEC95F043A}"/>
-              </a:ext>
-            </a:extLst>
-          </p:cNvPr>
-          <p:cNvSpPr txBox="1"/>
-          <p:nvPr/>
-        </p:nvSpPr>
-        <p:spPr>
-          <a:xfrm>
-            <a:off x="2891118" y="3939988"/>
-            <a:ext cx="6683188" cy="1323439"/>
-          </a:xfrm>
-          <a:prstGeom prst="rect">
-            <a:avLst/>
-          </a:prstGeom>
-          <a:noFill/>
-          <a:ln w="38100">
-            <a:solidFill>
-              <a:schemeClr val="tx1"/>
-            </a:solidFill>
-          </a:ln>
-        </p:spPr>
-        <p:txBody>
-          <a:bodyPr wrap="square" rtlCol="0">
-            <a:spAutoFit/>
-          </a:bodyPr>
-          <a:lstStyle/>
-          <a:p>
-            <a:pPr algn="ctr"/>
-            <a:r>
-              <a:rPr lang="en-US" sz="4000" dirty="0">
-                <a:latin typeface="Segoe UI Bold" panose="020B0802040204020203" pitchFamily="34" charset="0"/>
-                <a:cs typeface="Segoe UI Bold" panose="020B0802040204020203" pitchFamily="34" charset="0"/>
-              </a:rPr>
-              <a:t>You can filter for each Type of Show</a:t>
-            </a:r>
-            <a:endParaRPr lang="en-ID" sz="4000" dirty="0">
-              <a:latin typeface="Segoe UI Bold" panose="020B0802040204020203" pitchFamily="34" charset="0"/>
-              <a:cs typeface="Segoe UI Bold" panose="020B0802040204020203" pitchFamily="34" charset="0"/>
-            </a:endParaRPr>
-          </a:p>
-        </p:txBody>
-      </p:sp>
     </p:spTree>
     <p:extLst>
       <p:ext uri="{BB962C8B-B14F-4D97-AF65-F5344CB8AC3E}">
-        <p14:creationId xmlns:p14="http://schemas.microsoft.com/office/powerpoint/2010/main" val="1289587474"/>
+        <p14:creationId xmlns:p14="http://schemas.microsoft.com/office/powerpoint/2010/main" val="2082310184"/>
       </p:ext>
     </p:extLst>
   </p:cSld>
@@ -6613,10 +6564,10 @@
       </p:grpSpPr>
       <p:pic>
         <p:nvPicPr>
-          <p:cNvPr id="3" name="Picture 2">
+          <p:cNvPr id="4" name="Picture 3">
             <a:extLst>
               <a:ext uri="{FF2B5EF4-FFF2-40B4-BE49-F238E27FC236}">
-                <a16:creationId xmlns:a16="http://schemas.microsoft.com/office/drawing/2014/main" id="{659D83BC-164D-41A5-8997-251E587C039B}"/>
+                <a16:creationId xmlns:a16="http://schemas.microsoft.com/office/drawing/2014/main" id="{ADBB1C1F-0564-4C13-BFFA-34BC9EAB7359}"/>
               </a:ext>
             </a:extLst>
           </p:cNvPr>
@@ -6639,8 +6590,8 @@
         </p:blipFill>
         <p:spPr>
           <a:xfrm>
-            <a:off x="-1" y="0"/>
-            <a:ext cx="12192001" cy="6858000"/>
+            <a:off x="0" y="0"/>
+            <a:ext cx="12191999" cy="6858000"/>
           </a:xfrm>
           <a:prstGeom prst="rect">
             <a:avLst/>
@@ -6649,10 +6600,10 @@
       </p:pic>
       <p:sp>
         <p:nvSpPr>
-          <p:cNvPr id="4" name="Rectangle 3">
+          <p:cNvPr id="3" name="Rectangle 2">
             <a:extLst>
               <a:ext uri="{FF2B5EF4-FFF2-40B4-BE49-F238E27FC236}">
-                <a16:creationId xmlns:a16="http://schemas.microsoft.com/office/drawing/2014/main" id="{DCB515FA-8C5B-4FFF-82F2-6C248AE4D49E}"/>
+                <a16:creationId xmlns:a16="http://schemas.microsoft.com/office/drawing/2014/main" id="{5BD89113-C4AD-4FC0-BE0F-C403F187133E}"/>
               </a:ext>
             </a:extLst>
           </p:cNvPr>
@@ -6706,7 +6657,7 @@
           <p:cNvPr id="5" name="Rectangle 4">
             <a:extLst>
               <a:ext uri="{FF2B5EF4-FFF2-40B4-BE49-F238E27FC236}">
-                <a16:creationId xmlns:a16="http://schemas.microsoft.com/office/drawing/2014/main" id="{0B6F09E8-79E1-43C1-A792-EA8428CB8C52}"/>
+                <a16:creationId xmlns:a16="http://schemas.microsoft.com/office/drawing/2014/main" id="{A64C8399-7DA7-46D4-910E-9B86C770CE6E}"/>
               </a:ext>
             </a:extLst>
           </p:cNvPr>
@@ -6715,8 +6666,8 @@
         </p:nvSpPr>
         <p:spPr>
           <a:xfrm>
-            <a:off x="217714" y="206829"/>
-            <a:ext cx="1622445" cy="859971"/>
+            <a:off x="217713" y="217715"/>
+            <a:ext cx="1622446" cy="1853132"/>
           </a:xfrm>
           <a:prstGeom prst="rect">
             <a:avLst/>
@@ -6755,66 +6706,12 @@
           </a:p>
         </p:txBody>
       </p:sp>
-      <p:sp>
-        <p:nvSpPr>
-          <p:cNvPr id="6" name="Rectangle 5">
+      <p:pic>
+        <p:nvPicPr>
+          <p:cNvPr id="6" name="Picture 5">
             <a:extLst>
               <a:ext uri="{FF2B5EF4-FFF2-40B4-BE49-F238E27FC236}">
-                <a16:creationId xmlns:a16="http://schemas.microsoft.com/office/drawing/2014/main" id="{E2973C32-21B3-4DB2-B001-49D35CC6607B}"/>
-              </a:ext>
-            </a:extLst>
-          </p:cNvPr>
-          <p:cNvSpPr/>
-          <p:nvPr/>
-        </p:nvSpPr>
-        <p:spPr>
-          <a:xfrm>
-            <a:off x="217713" y="1066799"/>
-            <a:ext cx="1622446" cy="1004047"/>
-          </a:xfrm>
-          <a:prstGeom prst="rect">
-            <a:avLst/>
-          </a:prstGeom>
-          <a:solidFill>
-            <a:schemeClr val="accent1">
-              <a:alpha val="90000"/>
-            </a:schemeClr>
-          </a:solidFill>
-          <a:ln>
-            <a:noFill/>
-          </a:ln>
-        </p:spPr>
-        <p:style>
-          <a:lnRef idx="2">
-            <a:schemeClr val="accent1">
-              <a:shade val="50000"/>
-            </a:schemeClr>
-          </a:lnRef>
-          <a:fillRef idx="1">
-            <a:schemeClr val="accent1"/>
-          </a:fillRef>
-          <a:effectRef idx="0">
-            <a:schemeClr val="accent1"/>
-          </a:effectRef>
-          <a:fontRef idx="minor">
-            <a:schemeClr val="lt1"/>
-          </a:fontRef>
-        </p:style>
-        <p:txBody>
-          <a:bodyPr rtlCol="0" anchor="ctr"/>
-          <a:lstStyle/>
-          <a:p>
-            <a:pPr algn="ctr"/>
-            <a:endParaRPr lang="en-ID" dirty="0"/>
-          </a:p>
-        </p:txBody>
-      </p:sp>
-      <p:pic>
-        <p:nvPicPr>
-          <p:cNvPr id="7" name="Picture 6">
-            <a:extLst>
-              <a:ext uri="{FF2B5EF4-FFF2-40B4-BE49-F238E27FC236}">
-                <a16:creationId xmlns:a16="http://schemas.microsoft.com/office/drawing/2014/main" id="{73268426-AE20-4221-A4F9-8A31104EC6E5}"/>
+                <a16:creationId xmlns:a16="http://schemas.microsoft.com/office/drawing/2014/main" id="{B1FD2B31-8520-4B02-81CE-793CA435FDD0}"/>
               </a:ext>
             </a:extLst>
           </p:cNvPr>
@@ -6841,10 +6738,10 @@
       </p:pic>
       <p:cxnSp>
         <p:nvCxnSpPr>
-          <p:cNvPr id="8" name="Straight Arrow Connector 7">
+          <p:cNvPr id="7" name="Straight Arrow Connector 6">
             <a:extLst>
               <a:ext uri="{FF2B5EF4-FFF2-40B4-BE49-F238E27FC236}">
-                <a16:creationId xmlns:a16="http://schemas.microsoft.com/office/drawing/2014/main" id="{412E5ED9-2C17-4691-B987-F79D9C2F4B99}"/>
+                <a16:creationId xmlns:a16="http://schemas.microsoft.com/office/drawing/2014/main" id="{F182DE79-AB44-4DFA-8D1C-78195D82FB97}"/>
               </a:ext>
             </a:extLst>
           </p:cNvPr>
@@ -6855,8 +6752,8 @@
         </p:nvCxnSpPr>
         <p:spPr>
           <a:xfrm flipV="1">
-            <a:off x="1840159" y="2675965"/>
-            <a:ext cx="3095471" cy="1748117"/>
+            <a:off x="1840159" y="2786231"/>
+            <a:ext cx="3095472" cy="1637852"/>
           </a:xfrm>
           <a:prstGeom prst="straightConnector1">
             <a:avLst/>
@@ -6883,10 +6780,10 @@
       </p:cxnSp>
       <p:sp>
         <p:nvSpPr>
-          <p:cNvPr id="9" name="TextBox 8">
+          <p:cNvPr id="8" name="TextBox 7">
             <a:extLst>
               <a:ext uri="{FF2B5EF4-FFF2-40B4-BE49-F238E27FC236}">
-                <a16:creationId xmlns:a16="http://schemas.microsoft.com/office/drawing/2014/main" id="{1C1392FD-7BD1-4B6C-AB45-0F4752E63B78}"/>
+                <a16:creationId xmlns:a16="http://schemas.microsoft.com/office/drawing/2014/main" id="{FDF6545E-B823-4116-BEF4-8BDC6ED56779}"/>
               </a:ext>
             </a:extLst>
           </p:cNvPr>
@@ -6932,7 +6829,7 @@
     </p:spTree>
     <p:extLst>
       <p:ext uri="{BB962C8B-B14F-4D97-AF65-F5344CB8AC3E}">
-        <p14:creationId xmlns:p14="http://schemas.microsoft.com/office/powerpoint/2010/main" val="3944327283"/>
+        <p14:creationId xmlns:p14="http://schemas.microsoft.com/office/powerpoint/2010/main" val="3748363925"/>
       </p:ext>
     </p:extLst>
   </p:cSld>
@@ -6961,10 +6858,10 @@
       </p:grpSpPr>
       <p:pic>
         <p:nvPicPr>
-          <p:cNvPr id="3" name="Picture 2">
+          <p:cNvPr id="4" name="Picture 3">
             <a:extLst>
               <a:ext uri="{FF2B5EF4-FFF2-40B4-BE49-F238E27FC236}">
-                <a16:creationId xmlns:a16="http://schemas.microsoft.com/office/drawing/2014/main" id="{659D83BC-164D-41A5-8997-251E587C039B}"/>
+                <a16:creationId xmlns:a16="http://schemas.microsoft.com/office/drawing/2014/main" id="{ADBB1C1F-0564-4C13-BFFA-34BC9EAB7359}"/>
               </a:ext>
             </a:extLst>
           </p:cNvPr>
@@ -6987,8 +6884,8 @@
         </p:blipFill>
         <p:spPr>
           <a:xfrm>
-            <a:off x="-1" y="0"/>
-            <a:ext cx="12192001" cy="6858000"/>
+            <a:off x="0" y="0"/>
+            <a:ext cx="12191999" cy="6858000"/>
           </a:xfrm>
           <a:prstGeom prst="rect">
             <a:avLst/>
@@ -6997,10 +6894,10 @@
       </p:pic>
       <p:sp>
         <p:nvSpPr>
-          <p:cNvPr id="4" name="Rectangle 3">
+          <p:cNvPr id="3" name="Rectangle 2">
             <a:extLst>
               <a:ext uri="{FF2B5EF4-FFF2-40B4-BE49-F238E27FC236}">
-                <a16:creationId xmlns:a16="http://schemas.microsoft.com/office/drawing/2014/main" id="{37B7CA62-382B-4157-B4BE-592CE98DCAE0}"/>
+                <a16:creationId xmlns:a16="http://schemas.microsoft.com/office/drawing/2014/main" id="{C2985B51-A76F-45DE-B4E5-EA6EE4942F25}"/>
               </a:ext>
             </a:extLst>
           </p:cNvPr>
@@ -7054,7 +6951,7 @@
           <p:cNvPr id="5" name="Rectangle 4">
             <a:extLst>
               <a:ext uri="{FF2B5EF4-FFF2-40B4-BE49-F238E27FC236}">
-                <a16:creationId xmlns:a16="http://schemas.microsoft.com/office/drawing/2014/main" id="{3CE29029-EDFF-4417-AE9B-3D51A5CDE06D}"/>
+                <a16:creationId xmlns:a16="http://schemas.microsoft.com/office/drawing/2014/main" id="{24EF03CF-54F1-4046-ADCE-D2D8412128E9}"/>
               </a:ext>
             </a:extLst>
           </p:cNvPr>
@@ -7108,7 +7005,7 @@
           <p:cNvPr id="6" name="Straight Arrow Connector 5">
             <a:extLst>
               <a:ext uri="{FF2B5EF4-FFF2-40B4-BE49-F238E27FC236}">
-                <a16:creationId xmlns:a16="http://schemas.microsoft.com/office/drawing/2014/main" id="{CED984AD-425F-4345-9948-4C99ABBB0298}"/>
+                <a16:creationId xmlns:a16="http://schemas.microsoft.com/office/drawing/2014/main" id="{62FB96DF-BFA1-4D3C-BB90-B565140433C5}"/>
               </a:ext>
             </a:extLst>
           </p:cNvPr>
@@ -7150,7 +7047,7 @@
           <p:cNvPr id="7" name="TextBox 6">
             <a:extLst>
               <a:ext uri="{FF2B5EF4-FFF2-40B4-BE49-F238E27FC236}">
-                <a16:creationId xmlns:a16="http://schemas.microsoft.com/office/drawing/2014/main" id="{DAFA41E7-113A-417F-824E-543BCE211148}"/>
+                <a16:creationId xmlns:a16="http://schemas.microsoft.com/office/drawing/2014/main" id="{F6ED906D-91C3-4AC8-8A5F-B02E4F1AC944}"/>
               </a:ext>
             </a:extLst>
           </p:cNvPr>
@@ -7209,7 +7106,7 @@
     </p:spTree>
     <p:extLst>
       <p:ext uri="{BB962C8B-B14F-4D97-AF65-F5344CB8AC3E}">
-        <p14:creationId xmlns:p14="http://schemas.microsoft.com/office/powerpoint/2010/main" val="4150257742"/>
+        <p14:creationId xmlns:p14="http://schemas.microsoft.com/office/powerpoint/2010/main" val="2882212468"/>
       </p:ext>
     </p:extLst>
   </p:cSld>
@@ -7220,283 +7117,6 @@
 </file>
 
 <file path=ppt/slides/slide6.xml><?xml version="1.0" encoding="utf-8"?>
-<p:sld xmlns:a="http://schemas.openxmlformats.org/drawingml/2006/main" xmlns:r="http://schemas.openxmlformats.org/officeDocument/2006/relationships" xmlns:p="http://schemas.openxmlformats.org/presentationml/2006/main">
-  <p:cSld>
-    <p:spTree>
-      <p:nvGrpSpPr>
-        <p:cNvPr id="1" name=""/>
-        <p:cNvGrpSpPr/>
-        <p:nvPr/>
-      </p:nvGrpSpPr>
-      <p:grpSpPr>
-        <a:xfrm>
-          <a:off x="0" y="0"/>
-          <a:ext cx="0" cy="0"/>
-          <a:chOff x="0" y="0"/>
-          <a:chExt cx="0" cy="0"/>
-        </a:xfrm>
-      </p:grpSpPr>
-      <p:pic>
-        <p:nvPicPr>
-          <p:cNvPr id="3" name="Picture 2">
-            <a:extLst>
-              <a:ext uri="{FF2B5EF4-FFF2-40B4-BE49-F238E27FC236}">
-                <a16:creationId xmlns:a16="http://schemas.microsoft.com/office/drawing/2014/main" id="{A9870083-C984-49E3-99EA-26F8B968B670}"/>
-              </a:ext>
-            </a:extLst>
-          </p:cNvPr>
-          <p:cNvPicPr>
-            <a:picLocks noChangeAspect="1"/>
-          </p:cNvPicPr>
-          <p:nvPr/>
-        </p:nvPicPr>
-        <p:blipFill>
-          <a:blip r:embed="rId2">
-            <a:extLst>
-              <a:ext uri="{28A0092B-C50C-407E-A947-70E740481C1C}">
-                <a14:useLocalDpi xmlns:a14="http://schemas.microsoft.com/office/drawing/2010/main" val="0"/>
-              </a:ext>
-            </a:extLst>
-          </a:blip>
-          <a:stretch>
-            <a:fillRect/>
-          </a:stretch>
-        </p:blipFill>
-        <p:spPr>
-          <a:xfrm>
-            <a:off x="-215153" y="0"/>
-            <a:ext cx="12407153" cy="6858000"/>
-          </a:xfrm>
-          <a:prstGeom prst="rect">
-            <a:avLst/>
-          </a:prstGeom>
-        </p:spPr>
-      </p:pic>
-      <p:sp>
-        <p:nvSpPr>
-          <p:cNvPr id="2" name="Rectangle 1">
-            <a:extLst>
-              <a:ext uri="{FF2B5EF4-FFF2-40B4-BE49-F238E27FC236}">
-                <a16:creationId xmlns:a16="http://schemas.microsoft.com/office/drawing/2014/main" id="{2C2D3C04-B51C-4D1E-9324-7D33D70A27A3}"/>
-              </a:ext>
-            </a:extLst>
-          </p:cNvPr>
-          <p:cNvSpPr/>
-          <p:nvPr/>
-        </p:nvSpPr>
-        <p:spPr>
-          <a:xfrm>
-            <a:off x="3477" y="212270"/>
-            <a:ext cx="6892175" cy="6433457"/>
-          </a:xfrm>
-          <a:prstGeom prst="rect">
-            <a:avLst/>
-          </a:prstGeom>
-          <a:solidFill>
-            <a:schemeClr val="accent1">
-              <a:alpha val="95000"/>
-            </a:schemeClr>
-          </a:solidFill>
-          <a:ln>
-            <a:noFill/>
-          </a:ln>
-        </p:spPr>
-        <p:style>
-          <a:lnRef idx="2">
-            <a:schemeClr val="accent1">
-              <a:shade val="50000"/>
-            </a:schemeClr>
-          </a:lnRef>
-          <a:fillRef idx="1">
-            <a:schemeClr val="accent1"/>
-          </a:fillRef>
-          <a:effectRef idx="0">
-            <a:schemeClr val="accent1"/>
-          </a:effectRef>
-          <a:fontRef idx="minor">
-            <a:schemeClr val="lt1"/>
-          </a:fontRef>
-        </p:style>
-        <p:txBody>
-          <a:bodyPr rtlCol="0" anchor="ctr"/>
-          <a:lstStyle/>
-          <a:p>
-            <a:pPr algn="ctr"/>
-            <a:endParaRPr lang="en-ID" dirty="0"/>
-          </a:p>
-        </p:txBody>
-      </p:sp>
-      <p:sp>
-        <p:nvSpPr>
-          <p:cNvPr id="5" name="Rectangle 4">
-            <a:extLst>
-              <a:ext uri="{FF2B5EF4-FFF2-40B4-BE49-F238E27FC236}">
-                <a16:creationId xmlns:a16="http://schemas.microsoft.com/office/drawing/2014/main" id="{15FDBE9D-7CC1-4665-81F5-EC0C9CC4DF0B}"/>
-              </a:ext>
-            </a:extLst>
-          </p:cNvPr>
-          <p:cNvSpPr/>
-          <p:nvPr/>
-        </p:nvSpPr>
-        <p:spPr>
-          <a:xfrm>
-            <a:off x="6895652" y="212271"/>
-            <a:ext cx="5066852" cy="1874713"/>
-          </a:xfrm>
-          <a:prstGeom prst="rect">
-            <a:avLst/>
-          </a:prstGeom>
-          <a:solidFill>
-            <a:schemeClr val="accent1">
-              <a:alpha val="70000"/>
-            </a:schemeClr>
-          </a:solidFill>
-          <a:ln>
-            <a:noFill/>
-          </a:ln>
-        </p:spPr>
-        <p:style>
-          <a:lnRef idx="2">
-            <a:schemeClr val="accent1">
-              <a:shade val="50000"/>
-            </a:schemeClr>
-          </a:lnRef>
-          <a:fillRef idx="1">
-            <a:schemeClr val="accent1"/>
-          </a:fillRef>
-          <a:effectRef idx="0">
-            <a:schemeClr val="accent1"/>
-          </a:effectRef>
-          <a:fontRef idx="minor">
-            <a:schemeClr val="lt1"/>
-          </a:fontRef>
-        </p:style>
-        <p:txBody>
-          <a:bodyPr rtlCol="0" anchor="ctr"/>
-          <a:lstStyle/>
-          <a:p>
-            <a:pPr algn="ctr"/>
-            <a:endParaRPr lang="en-ID" dirty="0"/>
-          </a:p>
-        </p:txBody>
-      </p:sp>
-      <p:cxnSp>
-        <p:nvCxnSpPr>
-          <p:cNvPr id="8" name="Straight Arrow Connector 7">
-            <a:extLst>
-              <a:ext uri="{FF2B5EF4-FFF2-40B4-BE49-F238E27FC236}">
-                <a16:creationId xmlns:a16="http://schemas.microsoft.com/office/drawing/2014/main" id="{88DD947C-B603-4B1C-A205-04D9CF8E8285}"/>
-              </a:ext>
-            </a:extLst>
-          </p:cNvPr>
-          <p:cNvCxnSpPr>
-            <a:cxnSpLocks/>
-          </p:cNvCxnSpPr>
-          <p:nvPr/>
-        </p:nvCxnSpPr>
-        <p:spPr>
-          <a:xfrm>
-            <a:off x="5056094" y="3428999"/>
-            <a:ext cx="1839558" cy="760747"/>
-          </a:xfrm>
-          <a:prstGeom prst="straightConnector1">
-            <a:avLst/>
-          </a:prstGeom>
-          <a:ln w="38100">
-            <a:headEnd type="triangle"/>
-            <a:tailEnd type="triangle"/>
-          </a:ln>
-        </p:spPr>
-        <p:style>
-          <a:lnRef idx="1">
-            <a:schemeClr val="dk1"/>
-          </a:lnRef>
-          <a:fillRef idx="0">
-            <a:schemeClr val="dk1"/>
-          </a:fillRef>
-          <a:effectRef idx="0">
-            <a:schemeClr val="dk1"/>
-          </a:effectRef>
-          <a:fontRef idx="minor">
-            <a:schemeClr val="tx1"/>
-          </a:fontRef>
-        </p:style>
-      </p:cxnSp>
-      <p:sp>
-        <p:nvSpPr>
-          <p:cNvPr id="9" name="TextBox 8">
-            <a:extLst>
-              <a:ext uri="{FF2B5EF4-FFF2-40B4-BE49-F238E27FC236}">
-                <a16:creationId xmlns:a16="http://schemas.microsoft.com/office/drawing/2014/main" id="{182A4259-1AF3-45AD-8775-B08D034D32AA}"/>
-              </a:ext>
-            </a:extLst>
-          </p:cNvPr>
-          <p:cNvSpPr txBox="1"/>
-          <p:nvPr/>
-        </p:nvSpPr>
-        <p:spPr>
-          <a:xfrm>
-            <a:off x="548640" y="1443839"/>
-            <a:ext cx="4507454" cy="3539430"/>
-          </a:xfrm>
-          <a:prstGeom prst="rect">
-            <a:avLst/>
-          </a:prstGeom>
-          <a:noFill/>
-          <a:ln w="38100">
-            <a:solidFill>
-              <a:schemeClr val="tx1"/>
-            </a:solidFill>
-          </a:ln>
-        </p:spPr>
-        <p:txBody>
-          <a:bodyPr wrap="square" rtlCol="0">
-            <a:spAutoFit/>
-          </a:bodyPr>
-          <a:lstStyle/>
-          <a:p>
-            <a:pPr algn="ctr"/>
-            <a:r>
-              <a:rPr lang="en-US" sz="2800" dirty="0">
-                <a:latin typeface="Segoe UI Bold" panose="020B0802040204020203" pitchFamily="34" charset="0"/>
-                <a:cs typeface="Segoe UI Bold" panose="020B0802040204020203" pitchFamily="34" charset="0"/>
-              </a:rPr>
-              <a:t>You can hover over the bubbles to see the total number of shows for each country.</a:t>
-            </a:r>
-            <a:br>
-              <a:rPr lang="en-US" sz="2800" dirty="0">
-                <a:latin typeface="Segoe UI Bold" panose="020B0802040204020203" pitchFamily="34" charset="0"/>
-                <a:cs typeface="Segoe UI Bold" panose="020B0802040204020203" pitchFamily="34" charset="0"/>
-              </a:rPr>
-            </a:br>
-            <a:r>
-              <a:rPr lang="en-US" sz="2800" dirty="0">
-                <a:latin typeface="Segoe UI Bold" panose="020B0802040204020203" pitchFamily="34" charset="0"/>
-                <a:cs typeface="Segoe UI Bold" panose="020B0802040204020203" pitchFamily="34" charset="0"/>
-              </a:rPr>
-              <a:t>Click on a bubble to filter the data and view the date added for shows from that country.</a:t>
-            </a:r>
-            <a:endParaRPr lang="en-ID" sz="2800" dirty="0">
-              <a:latin typeface="Segoe UI Bold" panose="020B0802040204020203" pitchFamily="34" charset="0"/>
-              <a:cs typeface="Segoe UI Bold" panose="020B0802040204020203" pitchFamily="34" charset="0"/>
-            </a:endParaRPr>
-          </a:p>
-        </p:txBody>
-      </p:sp>
-    </p:spTree>
-    <p:extLst>
-      <p:ext uri="{BB962C8B-B14F-4D97-AF65-F5344CB8AC3E}">
-        <p14:creationId xmlns:p14="http://schemas.microsoft.com/office/powerpoint/2010/main" val="1670547473"/>
-      </p:ext>
-    </p:extLst>
-  </p:cSld>
-  <p:clrMapOvr>
-    <a:masterClrMapping/>
-  </p:clrMapOvr>
-</p:sld>
-</file>
-
-<file path=ppt/slides/slide7.xml><?xml version="1.0" encoding="utf-8"?>
 <p:sld xmlns:a="http://schemas.openxmlformats.org/drawingml/2006/main" xmlns:r="http://schemas.openxmlformats.org/officeDocument/2006/relationships" xmlns:p="http://schemas.openxmlformats.org/presentationml/2006/main">
   <p:cSld>
     <p:spTree>

</xml_diff>

<commit_message>
replace: replace the old ppt file with the new one
</commit_message>
<xml_diff>
--- a/netflix-shows/docs/Netflix_Dashboard_Guide.pptx
+++ b/netflix-shows/docs/Netflix_Dashboard_Guide.pptx
@@ -302,7 +302,7 @@
           <a:p>
             <a:fld id="{84E633C6-B3A5-4CD0-9756-A614F40A934F}" type="datetimeFigureOut">
               <a:rPr lang="en-ID" smtClean="0"/>
-              <a:t>08/08/2025</a:t>
+              <a:t>09/08/2025</a:t>
             </a:fld>
             <a:endParaRPr lang="en-ID"/>
           </a:p>
@@ -600,7 +600,7 @@
           <a:p>
             <a:fld id="{84E633C6-B3A5-4CD0-9756-A614F40A934F}" type="datetimeFigureOut">
               <a:rPr lang="en-ID" smtClean="0"/>
-              <a:t>08/08/2025</a:t>
+              <a:t>09/08/2025</a:t>
             </a:fld>
             <a:endParaRPr lang="en-ID"/>
           </a:p>
@@ -792,7 +792,7 @@
           <a:p>
             <a:fld id="{84E633C6-B3A5-4CD0-9756-A614F40A934F}" type="datetimeFigureOut">
               <a:rPr lang="en-ID" smtClean="0"/>
-              <a:t>08/08/2025</a:t>
+              <a:t>09/08/2025</a:t>
             </a:fld>
             <a:endParaRPr lang="en-ID"/>
           </a:p>
@@ -1053,7 +1053,7 @@
           <a:p>
             <a:fld id="{84E633C6-B3A5-4CD0-9756-A614F40A934F}" type="datetimeFigureOut">
               <a:rPr lang="en-ID" smtClean="0"/>
-              <a:t>08/08/2025</a:t>
+              <a:t>09/08/2025</a:t>
             </a:fld>
             <a:endParaRPr lang="en-ID"/>
           </a:p>
@@ -1477,7 +1477,7 @@
           <a:p>
             <a:fld id="{84E633C6-B3A5-4CD0-9756-A614F40A934F}" type="datetimeFigureOut">
               <a:rPr lang="en-ID" smtClean="0"/>
-              <a:t>08/08/2025</a:t>
+              <a:t>09/08/2025</a:t>
             </a:fld>
             <a:endParaRPr lang="en-ID"/>
           </a:p>
@@ -2014,7 +2014,7 @@
           <a:p>
             <a:fld id="{84E633C6-B3A5-4CD0-9756-A614F40A934F}" type="datetimeFigureOut">
               <a:rPr lang="en-ID" smtClean="0"/>
-              <a:t>08/08/2025</a:t>
+              <a:t>09/08/2025</a:t>
             </a:fld>
             <a:endParaRPr lang="en-ID"/>
           </a:p>
@@ -2878,7 +2878,7 @@
           <a:p>
             <a:fld id="{84E633C6-B3A5-4CD0-9756-A614F40A934F}" type="datetimeFigureOut">
               <a:rPr lang="en-ID" smtClean="0"/>
-              <a:t>08/08/2025</a:t>
+              <a:t>09/08/2025</a:t>
             </a:fld>
             <a:endParaRPr lang="en-ID"/>
           </a:p>
@@ -3048,7 +3048,7 @@
           <a:p>
             <a:fld id="{84E633C6-B3A5-4CD0-9756-A614F40A934F}" type="datetimeFigureOut">
               <a:rPr lang="en-ID" smtClean="0"/>
-              <a:t>08/08/2025</a:t>
+              <a:t>09/08/2025</a:t>
             </a:fld>
             <a:endParaRPr lang="en-ID"/>
           </a:p>
@@ -3232,7 +3232,7 @@
           <a:p>
             <a:fld id="{84E633C6-B3A5-4CD0-9756-A614F40A934F}" type="datetimeFigureOut">
               <a:rPr lang="en-ID" smtClean="0"/>
-              <a:t>08/08/2025</a:t>
+              <a:t>09/08/2025</a:t>
             </a:fld>
             <a:endParaRPr lang="en-ID"/>
           </a:p>
@@ -3402,7 +3402,7 @@
           <a:p>
             <a:fld id="{84E633C6-B3A5-4CD0-9756-A614F40A934F}" type="datetimeFigureOut">
               <a:rPr lang="en-ID" smtClean="0"/>
-              <a:t>08/08/2025</a:t>
+              <a:t>09/08/2025</a:t>
             </a:fld>
             <a:endParaRPr lang="en-ID"/>
           </a:p>
@@ -3646,7 +3646,7 @@
           <a:p>
             <a:fld id="{84E633C6-B3A5-4CD0-9756-A614F40A934F}" type="datetimeFigureOut">
               <a:rPr lang="en-ID" smtClean="0"/>
-              <a:t>08/08/2025</a:t>
+              <a:t>09/08/2025</a:t>
             </a:fld>
             <a:endParaRPr lang="en-ID"/>
           </a:p>
@@ -3882,7 +3882,7 @@
           <a:p>
             <a:fld id="{84E633C6-B3A5-4CD0-9756-A614F40A934F}" type="datetimeFigureOut">
               <a:rPr lang="en-ID" smtClean="0"/>
-              <a:t>08/08/2025</a:t>
+              <a:t>09/08/2025</a:t>
             </a:fld>
             <a:endParaRPr lang="en-ID"/>
           </a:p>
@@ -4348,7 +4348,7 @@
           <a:p>
             <a:fld id="{84E633C6-B3A5-4CD0-9756-A614F40A934F}" type="datetimeFigureOut">
               <a:rPr lang="en-ID" smtClean="0"/>
-              <a:t>08/08/2025</a:t>
+              <a:t>09/08/2025</a:t>
             </a:fld>
             <a:endParaRPr lang="en-ID"/>
           </a:p>
@@ -4466,7 +4466,7 @@
           <a:p>
             <a:fld id="{84E633C6-B3A5-4CD0-9756-A614F40A934F}" type="datetimeFigureOut">
               <a:rPr lang="en-ID" smtClean="0"/>
-              <a:t>08/08/2025</a:t>
+              <a:t>09/08/2025</a:t>
             </a:fld>
             <a:endParaRPr lang="en-ID"/>
           </a:p>
@@ -4561,7 +4561,7 @@
           <a:p>
             <a:fld id="{84E633C6-B3A5-4CD0-9756-A614F40A934F}" type="datetimeFigureOut">
               <a:rPr lang="en-ID" smtClean="0"/>
-              <a:t>08/08/2025</a:t>
+              <a:t>09/08/2025</a:t>
             </a:fld>
             <a:endParaRPr lang="en-ID"/>
           </a:p>
@@ -4816,7 +4816,7 @@
           <a:p>
             <a:fld id="{84E633C6-B3A5-4CD0-9756-A614F40A934F}" type="datetimeFigureOut">
               <a:rPr lang="en-ID" smtClean="0"/>
-              <a:t>08/08/2025</a:t>
+              <a:t>09/08/2025</a:t>
             </a:fld>
             <a:endParaRPr lang="en-ID"/>
           </a:p>
@@ -5116,7 +5116,7 @@
           <a:p>
             <a:fld id="{84E633C6-B3A5-4CD0-9756-A614F40A934F}" type="datetimeFigureOut">
               <a:rPr lang="en-ID" smtClean="0"/>
-              <a:t>08/08/2025</a:t>
+              <a:t>09/08/2025</a:t>
             </a:fld>
             <a:endParaRPr lang="en-ID"/>
           </a:p>
@@ -5350,7 +5350,7 @@
           <a:p>
             <a:fld id="{84E633C6-B3A5-4CD0-9756-A614F40A934F}" type="datetimeFigureOut">
               <a:rPr lang="en-ID" smtClean="0"/>
-              <a:t>08/08/2025</a:t>
+              <a:t>09/08/2025</a:t>
             </a:fld>
             <a:endParaRPr lang="en-ID"/>
           </a:p>
@@ -6532,6 +6532,54 @@
           </a:prstGeom>
         </p:spPr>
       </p:pic>
+      <p:sp>
+        <p:nvSpPr>
+          <p:cNvPr id="10" name="TextBox 9">
+            <a:extLst>
+              <a:ext uri="{FF2B5EF4-FFF2-40B4-BE49-F238E27FC236}">
+                <a16:creationId xmlns:a16="http://schemas.microsoft.com/office/drawing/2014/main" id="{7E760F51-EFD9-4499-A993-D0258CFE65FD}"/>
+              </a:ext>
+            </a:extLst>
+          </p:cNvPr>
+          <p:cNvSpPr txBox="1"/>
+          <p:nvPr/>
+        </p:nvSpPr>
+        <p:spPr>
+          <a:xfrm>
+            <a:off x="1962379" y="4041191"/>
+            <a:ext cx="8612183" cy="1323439"/>
+          </a:xfrm>
+          <a:prstGeom prst="rect">
+            <a:avLst/>
+          </a:prstGeom>
+          <a:noFill/>
+          <a:ln w="38100">
+            <a:solidFill>
+              <a:schemeClr val="tx1"/>
+            </a:solidFill>
+          </a:ln>
+        </p:spPr>
+        <p:txBody>
+          <a:bodyPr wrap="square" rtlCol="0">
+            <a:spAutoFit/>
+          </a:bodyPr>
+          <a:lstStyle/>
+          <a:p>
+            <a:pPr algn="ctr"/>
+            <a:r>
+              <a:rPr lang="en-US" sz="4000" dirty="0">
+                <a:latin typeface="Segoe UI Bold" panose="020B0802040204020203" pitchFamily="34" charset="0"/>
+                <a:cs typeface="Segoe UI Bold" panose="020B0802040204020203" pitchFamily="34" charset="0"/>
+              </a:rPr>
+              <a:t>You can filter for each type of show</a:t>
+            </a:r>
+            <a:endParaRPr lang="en-ID" sz="4000" dirty="0">
+              <a:latin typeface="Segoe UI Bold" panose="020B0802040204020203" pitchFamily="34" charset="0"/>
+              <a:cs typeface="Segoe UI Bold" panose="020B0802040204020203" pitchFamily="34" charset="0"/>
+            </a:endParaRPr>
+          </a:p>
+        </p:txBody>
+      </p:sp>
     </p:spTree>
     <p:extLst>
       <p:ext uri="{BB962C8B-B14F-4D97-AF65-F5344CB8AC3E}">

</xml_diff>

<commit_message>
fix: replace 'netflix-shows' folder containing error files with a new folder with fixed files
</commit_message>
<xml_diff>
--- a/netflix-shows/docs/Netflix_Dashboard_Guide.pptx
+++ b/netflix-shows/docs/Netflix_Dashboard_Guide.pptx
@@ -7,9 +7,9 @@
   <p:sldIdLst>
     <p:sldId id="256" r:id="rId2"/>
     <p:sldId id="267" r:id="rId3"/>
-    <p:sldId id="262" r:id="rId4"/>
-    <p:sldId id="268" r:id="rId5"/>
-    <p:sldId id="269" r:id="rId6"/>
+    <p:sldId id="270" r:id="rId4"/>
+    <p:sldId id="271" r:id="rId5"/>
+    <p:sldId id="272" r:id="rId6"/>
     <p:sldId id="266" r:id="rId7"/>
   </p:sldIdLst>
   <p:sldSz cx="12192000" cy="6858000"/>
@@ -302,7 +302,7 @@
           <a:p>
             <a:fld id="{84E633C6-B3A5-4CD0-9756-A614F40A934F}" type="datetimeFigureOut">
               <a:rPr lang="en-ID" smtClean="0"/>
-              <a:t>09/08/2025</a:t>
+              <a:t>28/08/2025</a:t>
             </a:fld>
             <a:endParaRPr lang="en-ID"/>
           </a:p>
@@ -600,7 +600,7 @@
           <a:p>
             <a:fld id="{84E633C6-B3A5-4CD0-9756-A614F40A934F}" type="datetimeFigureOut">
               <a:rPr lang="en-ID" smtClean="0"/>
-              <a:t>09/08/2025</a:t>
+              <a:t>28/08/2025</a:t>
             </a:fld>
             <a:endParaRPr lang="en-ID"/>
           </a:p>
@@ -792,7 +792,7 @@
           <a:p>
             <a:fld id="{84E633C6-B3A5-4CD0-9756-A614F40A934F}" type="datetimeFigureOut">
               <a:rPr lang="en-ID" smtClean="0"/>
-              <a:t>09/08/2025</a:t>
+              <a:t>28/08/2025</a:t>
             </a:fld>
             <a:endParaRPr lang="en-ID"/>
           </a:p>
@@ -1053,7 +1053,7 @@
           <a:p>
             <a:fld id="{84E633C6-B3A5-4CD0-9756-A614F40A934F}" type="datetimeFigureOut">
               <a:rPr lang="en-ID" smtClean="0"/>
-              <a:t>09/08/2025</a:t>
+              <a:t>28/08/2025</a:t>
             </a:fld>
             <a:endParaRPr lang="en-ID"/>
           </a:p>
@@ -1477,7 +1477,7 @@
           <a:p>
             <a:fld id="{84E633C6-B3A5-4CD0-9756-A614F40A934F}" type="datetimeFigureOut">
               <a:rPr lang="en-ID" smtClean="0"/>
-              <a:t>09/08/2025</a:t>
+              <a:t>28/08/2025</a:t>
             </a:fld>
             <a:endParaRPr lang="en-ID"/>
           </a:p>
@@ -2014,7 +2014,7 @@
           <a:p>
             <a:fld id="{84E633C6-B3A5-4CD0-9756-A614F40A934F}" type="datetimeFigureOut">
               <a:rPr lang="en-ID" smtClean="0"/>
-              <a:t>09/08/2025</a:t>
+              <a:t>28/08/2025</a:t>
             </a:fld>
             <a:endParaRPr lang="en-ID"/>
           </a:p>
@@ -2878,7 +2878,7 @@
           <a:p>
             <a:fld id="{84E633C6-B3A5-4CD0-9756-A614F40A934F}" type="datetimeFigureOut">
               <a:rPr lang="en-ID" smtClean="0"/>
-              <a:t>09/08/2025</a:t>
+              <a:t>28/08/2025</a:t>
             </a:fld>
             <a:endParaRPr lang="en-ID"/>
           </a:p>
@@ -3048,7 +3048,7 @@
           <a:p>
             <a:fld id="{84E633C6-B3A5-4CD0-9756-A614F40A934F}" type="datetimeFigureOut">
               <a:rPr lang="en-ID" smtClean="0"/>
-              <a:t>09/08/2025</a:t>
+              <a:t>28/08/2025</a:t>
             </a:fld>
             <a:endParaRPr lang="en-ID"/>
           </a:p>
@@ -3232,7 +3232,7 @@
           <a:p>
             <a:fld id="{84E633C6-B3A5-4CD0-9756-A614F40A934F}" type="datetimeFigureOut">
               <a:rPr lang="en-ID" smtClean="0"/>
-              <a:t>09/08/2025</a:t>
+              <a:t>28/08/2025</a:t>
             </a:fld>
             <a:endParaRPr lang="en-ID"/>
           </a:p>
@@ -3402,7 +3402,7 @@
           <a:p>
             <a:fld id="{84E633C6-B3A5-4CD0-9756-A614F40A934F}" type="datetimeFigureOut">
               <a:rPr lang="en-ID" smtClean="0"/>
-              <a:t>09/08/2025</a:t>
+              <a:t>28/08/2025</a:t>
             </a:fld>
             <a:endParaRPr lang="en-ID"/>
           </a:p>
@@ -3646,7 +3646,7 @@
           <a:p>
             <a:fld id="{84E633C6-B3A5-4CD0-9756-A614F40A934F}" type="datetimeFigureOut">
               <a:rPr lang="en-ID" smtClean="0"/>
-              <a:t>09/08/2025</a:t>
+              <a:t>28/08/2025</a:t>
             </a:fld>
             <a:endParaRPr lang="en-ID"/>
           </a:p>
@@ -3882,7 +3882,7 @@
           <a:p>
             <a:fld id="{84E633C6-B3A5-4CD0-9756-A614F40A934F}" type="datetimeFigureOut">
               <a:rPr lang="en-ID" smtClean="0"/>
-              <a:t>09/08/2025</a:t>
+              <a:t>28/08/2025</a:t>
             </a:fld>
             <a:endParaRPr lang="en-ID"/>
           </a:p>
@@ -4348,7 +4348,7 @@
           <a:p>
             <a:fld id="{84E633C6-B3A5-4CD0-9756-A614F40A934F}" type="datetimeFigureOut">
               <a:rPr lang="en-ID" smtClean="0"/>
-              <a:t>09/08/2025</a:t>
+              <a:t>28/08/2025</a:t>
             </a:fld>
             <a:endParaRPr lang="en-ID"/>
           </a:p>
@@ -4466,7 +4466,7 @@
           <a:p>
             <a:fld id="{84E633C6-B3A5-4CD0-9756-A614F40A934F}" type="datetimeFigureOut">
               <a:rPr lang="en-ID" smtClean="0"/>
-              <a:t>09/08/2025</a:t>
+              <a:t>28/08/2025</a:t>
             </a:fld>
             <a:endParaRPr lang="en-ID"/>
           </a:p>
@@ -4561,7 +4561,7 @@
           <a:p>
             <a:fld id="{84E633C6-B3A5-4CD0-9756-A614F40A934F}" type="datetimeFigureOut">
               <a:rPr lang="en-ID" smtClean="0"/>
-              <a:t>09/08/2025</a:t>
+              <a:t>28/08/2025</a:t>
             </a:fld>
             <a:endParaRPr lang="en-ID"/>
           </a:p>
@@ -4816,7 +4816,7 @@
           <a:p>
             <a:fld id="{84E633C6-B3A5-4CD0-9756-A614F40A934F}" type="datetimeFigureOut">
               <a:rPr lang="en-ID" smtClean="0"/>
-              <a:t>09/08/2025</a:t>
+              <a:t>28/08/2025</a:t>
             </a:fld>
             <a:endParaRPr lang="en-ID"/>
           </a:p>
@@ -5116,7 +5116,7 @@
           <a:p>
             <a:fld id="{84E633C6-B3A5-4CD0-9756-A614F40A934F}" type="datetimeFigureOut">
               <a:rPr lang="en-ID" smtClean="0"/>
-              <a:t>09/08/2025</a:t>
+              <a:t>28/08/2025</a:t>
             </a:fld>
             <a:endParaRPr lang="en-ID"/>
           </a:p>
@@ -5350,7 +5350,7 @@
           <a:p>
             <a:fld id="{84E633C6-B3A5-4CD0-9756-A614F40A934F}" type="datetimeFigureOut">
               <a:rPr lang="en-ID" smtClean="0"/>
-              <a:t>09/08/2025</a:t>
+              <a:t>28/08/2025</a:t>
             </a:fld>
             <a:endParaRPr lang="en-ID"/>
           </a:p>
@@ -6198,10 +6198,10 @@
       </p:grpSpPr>
       <p:pic>
         <p:nvPicPr>
-          <p:cNvPr id="4" name="Picture 3">
+          <p:cNvPr id="3" name="Picture 2">
             <a:extLst>
               <a:ext uri="{FF2B5EF4-FFF2-40B4-BE49-F238E27FC236}">
-                <a16:creationId xmlns:a16="http://schemas.microsoft.com/office/drawing/2014/main" id="{ADBB1C1F-0564-4C13-BFFA-34BC9EAB7359}"/>
+                <a16:creationId xmlns:a16="http://schemas.microsoft.com/office/drawing/2014/main" id="{E45FEF35-064C-450A-A782-961B4D8AA353}"/>
               </a:ext>
             </a:extLst>
           </p:cNvPr>
@@ -6264,10 +6264,10 @@
       </p:grpSpPr>
       <p:pic>
         <p:nvPicPr>
-          <p:cNvPr id="4" name="Picture 3">
+          <p:cNvPr id="3" name="Picture 2">
             <a:extLst>
               <a:ext uri="{FF2B5EF4-FFF2-40B4-BE49-F238E27FC236}">
-                <a16:creationId xmlns:a16="http://schemas.microsoft.com/office/drawing/2014/main" id="{ADBB1C1F-0564-4C13-BFFA-34BC9EAB7359}"/>
+                <a16:creationId xmlns:a16="http://schemas.microsoft.com/office/drawing/2014/main" id="{E45FEF35-064C-450A-A782-961B4D8AA353}"/>
               </a:ext>
             </a:extLst>
           </p:cNvPr>
@@ -6300,10 +6300,10 @@
       </p:pic>
       <p:sp>
         <p:nvSpPr>
-          <p:cNvPr id="5" name="Rectangle 4">
+          <p:cNvPr id="4" name="Rectangle 3">
             <a:extLst>
               <a:ext uri="{FF2B5EF4-FFF2-40B4-BE49-F238E27FC236}">
-                <a16:creationId xmlns:a16="http://schemas.microsoft.com/office/drawing/2014/main" id="{D3BB2CF5-B71A-40F0-A9A0-56F96D425993}"/>
+                <a16:creationId xmlns:a16="http://schemas.microsoft.com/office/drawing/2014/main" id="{CC3FA850-626F-4C7E-A984-4F4FCEE05D9B}"/>
               </a:ext>
             </a:extLst>
           </p:cNvPr>
@@ -6354,10 +6354,10 @@
       </p:sp>
       <p:sp>
         <p:nvSpPr>
-          <p:cNvPr id="6" name="Rectangle 5">
+          <p:cNvPr id="5" name="Rectangle 4">
             <a:extLst>
               <a:ext uri="{FF2B5EF4-FFF2-40B4-BE49-F238E27FC236}">
-                <a16:creationId xmlns:a16="http://schemas.microsoft.com/office/drawing/2014/main" id="{8607C15A-3284-4698-A488-021484AF6161}"/>
+                <a16:creationId xmlns:a16="http://schemas.microsoft.com/office/drawing/2014/main" id="{58D49459-730C-48BA-925F-215E8851C7D1}"/>
               </a:ext>
             </a:extLst>
           </p:cNvPr>
@@ -6408,10 +6408,10 @@
       </p:sp>
       <p:sp>
         <p:nvSpPr>
-          <p:cNvPr id="7" name="Rectangle 6">
+          <p:cNvPr id="6" name="Rectangle 5">
             <a:extLst>
               <a:ext uri="{FF2B5EF4-FFF2-40B4-BE49-F238E27FC236}">
-                <a16:creationId xmlns:a16="http://schemas.microsoft.com/office/drawing/2014/main" id="{9FFD2395-C5FA-43D8-9A0E-98F3D892E88A}"/>
+                <a16:creationId xmlns:a16="http://schemas.microsoft.com/office/drawing/2014/main" id="{BA79A666-8592-4EFD-B589-F65D098B0A3F}"/>
               </a:ext>
             </a:extLst>
           </p:cNvPr>
@@ -6462,10 +6462,10 @@
       </p:sp>
       <p:cxnSp>
         <p:nvCxnSpPr>
-          <p:cNvPr id="8" name="Straight Arrow Connector 7">
+          <p:cNvPr id="7" name="Straight Arrow Connector 6">
             <a:extLst>
               <a:ext uri="{FF2B5EF4-FFF2-40B4-BE49-F238E27FC236}">
-                <a16:creationId xmlns:a16="http://schemas.microsoft.com/office/drawing/2014/main" id="{57FCEC74-DA8F-4D89-8CCB-A938F34DAEB8}"/>
+                <a16:creationId xmlns:a16="http://schemas.microsoft.com/office/drawing/2014/main" id="{24FA8F81-BD7B-4CA6-82B3-F187DE4435FA}"/>
               </a:ext>
             </a:extLst>
           </p:cNvPr>
@@ -6504,10 +6504,10 @@
       </p:cxnSp>
       <p:pic>
         <p:nvPicPr>
-          <p:cNvPr id="9" name="Picture 8">
+          <p:cNvPr id="8" name="Picture 7">
             <a:extLst>
               <a:ext uri="{FF2B5EF4-FFF2-40B4-BE49-F238E27FC236}">
-                <a16:creationId xmlns:a16="http://schemas.microsoft.com/office/drawing/2014/main" id="{EF8BD0F2-7A4D-4CFF-8B5F-652795BAAF6C}"/>
+                <a16:creationId xmlns:a16="http://schemas.microsoft.com/office/drawing/2014/main" id="{91FCAEF7-9344-4781-AC99-ED4BF4B24616}"/>
               </a:ext>
             </a:extLst>
           </p:cNvPr>
@@ -6534,10 +6534,10 @@
       </p:pic>
       <p:sp>
         <p:nvSpPr>
-          <p:cNvPr id="10" name="TextBox 9">
+          <p:cNvPr id="9" name="TextBox 8">
             <a:extLst>
               <a:ext uri="{FF2B5EF4-FFF2-40B4-BE49-F238E27FC236}">
-                <a16:creationId xmlns:a16="http://schemas.microsoft.com/office/drawing/2014/main" id="{7E760F51-EFD9-4499-A993-D0258CFE65FD}"/>
+                <a16:creationId xmlns:a16="http://schemas.microsoft.com/office/drawing/2014/main" id="{AA549A10-6670-453B-B231-9B27F55E198F}"/>
               </a:ext>
             </a:extLst>
           </p:cNvPr>
@@ -6583,7 +6583,7 @@
     </p:spTree>
     <p:extLst>
       <p:ext uri="{BB962C8B-B14F-4D97-AF65-F5344CB8AC3E}">
-        <p14:creationId xmlns:p14="http://schemas.microsoft.com/office/powerpoint/2010/main" val="2082310184"/>
+        <p14:creationId xmlns:p14="http://schemas.microsoft.com/office/powerpoint/2010/main" val="1821952261"/>
       </p:ext>
     </p:extLst>
   </p:cSld>
@@ -6612,10 +6612,10 @@
       </p:grpSpPr>
       <p:pic>
         <p:nvPicPr>
-          <p:cNvPr id="4" name="Picture 3">
+          <p:cNvPr id="3" name="Picture 2">
             <a:extLst>
               <a:ext uri="{FF2B5EF4-FFF2-40B4-BE49-F238E27FC236}">
-                <a16:creationId xmlns:a16="http://schemas.microsoft.com/office/drawing/2014/main" id="{ADBB1C1F-0564-4C13-BFFA-34BC9EAB7359}"/>
+                <a16:creationId xmlns:a16="http://schemas.microsoft.com/office/drawing/2014/main" id="{E45FEF35-064C-450A-A782-961B4D8AA353}"/>
               </a:ext>
             </a:extLst>
           </p:cNvPr>
@@ -6648,10 +6648,10 @@
       </p:pic>
       <p:sp>
         <p:nvSpPr>
-          <p:cNvPr id="3" name="Rectangle 2">
+          <p:cNvPr id="4" name="Rectangle 3">
             <a:extLst>
               <a:ext uri="{FF2B5EF4-FFF2-40B4-BE49-F238E27FC236}">
-                <a16:creationId xmlns:a16="http://schemas.microsoft.com/office/drawing/2014/main" id="{5BD89113-C4AD-4FC0-BE0F-C403F187133E}"/>
+                <a16:creationId xmlns:a16="http://schemas.microsoft.com/office/drawing/2014/main" id="{83616A70-31E6-4674-BC66-304ABB9DC0A4}"/>
               </a:ext>
             </a:extLst>
           </p:cNvPr>
@@ -6705,7 +6705,7 @@
           <p:cNvPr id="5" name="Rectangle 4">
             <a:extLst>
               <a:ext uri="{FF2B5EF4-FFF2-40B4-BE49-F238E27FC236}">
-                <a16:creationId xmlns:a16="http://schemas.microsoft.com/office/drawing/2014/main" id="{A64C8399-7DA7-46D4-910E-9B86C770CE6E}"/>
+                <a16:creationId xmlns:a16="http://schemas.microsoft.com/office/drawing/2014/main" id="{C2E70A8E-83A4-4CD0-AFDD-7B967A9CEEBA}"/>
               </a:ext>
             </a:extLst>
           </p:cNvPr>
@@ -6759,7 +6759,7 @@
           <p:cNvPr id="6" name="Picture 5">
             <a:extLst>
               <a:ext uri="{FF2B5EF4-FFF2-40B4-BE49-F238E27FC236}">
-                <a16:creationId xmlns:a16="http://schemas.microsoft.com/office/drawing/2014/main" id="{B1FD2B31-8520-4B02-81CE-793CA435FDD0}"/>
+                <a16:creationId xmlns:a16="http://schemas.microsoft.com/office/drawing/2014/main" id="{4B3D6B43-C8F0-45B3-B689-D80F4AC166DC}"/>
               </a:ext>
             </a:extLst>
           </p:cNvPr>
@@ -6789,7 +6789,7 @@
           <p:cNvPr id="7" name="Straight Arrow Connector 6">
             <a:extLst>
               <a:ext uri="{FF2B5EF4-FFF2-40B4-BE49-F238E27FC236}">
-                <a16:creationId xmlns:a16="http://schemas.microsoft.com/office/drawing/2014/main" id="{F182DE79-AB44-4DFA-8D1C-78195D82FB97}"/>
+                <a16:creationId xmlns:a16="http://schemas.microsoft.com/office/drawing/2014/main" id="{9AA1EFCE-BD01-4F82-A712-EB63E2817B80}"/>
               </a:ext>
             </a:extLst>
           </p:cNvPr>
@@ -6831,7 +6831,7 @@
           <p:cNvPr id="8" name="TextBox 7">
             <a:extLst>
               <a:ext uri="{FF2B5EF4-FFF2-40B4-BE49-F238E27FC236}">
-                <a16:creationId xmlns:a16="http://schemas.microsoft.com/office/drawing/2014/main" id="{FDF6545E-B823-4116-BEF4-8BDC6ED56779}"/>
+                <a16:creationId xmlns:a16="http://schemas.microsoft.com/office/drawing/2014/main" id="{B2F7A616-2B5C-4E01-9B8D-3096E32FB5DF}"/>
               </a:ext>
             </a:extLst>
           </p:cNvPr>
@@ -6877,7 +6877,7 @@
     </p:spTree>
     <p:extLst>
       <p:ext uri="{BB962C8B-B14F-4D97-AF65-F5344CB8AC3E}">
-        <p14:creationId xmlns:p14="http://schemas.microsoft.com/office/powerpoint/2010/main" val="3748363925"/>
+        <p14:creationId xmlns:p14="http://schemas.microsoft.com/office/powerpoint/2010/main" val="2012516392"/>
       </p:ext>
     </p:extLst>
   </p:cSld>
@@ -6906,10 +6906,10 @@
       </p:grpSpPr>
       <p:pic>
         <p:nvPicPr>
-          <p:cNvPr id="4" name="Picture 3">
+          <p:cNvPr id="3" name="Picture 2">
             <a:extLst>
               <a:ext uri="{FF2B5EF4-FFF2-40B4-BE49-F238E27FC236}">
-                <a16:creationId xmlns:a16="http://schemas.microsoft.com/office/drawing/2014/main" id="{ADBB1C1F-0564-4C13-BFFA-34BC9EAB7359}"/>
+                <a16:creationId xmlns:a16="http://schemas.microsoft.com/office/drawing/2014/main" id="{E45FEF35-064C-450A-A782-961B4D8AA353}"/>
               </a:ext>
             </a:extLst>
           </p:cNvPr>
@@ -6942,10 +6942,10 @@
       </p:pic>
       <p:sp>
         <p:nvSpPr>
-          <p:cNvPr id="3" name="Rectangle 2">
+          <p:cNvPr id="4" name="Rectangle 3">
             <a:extLst>
               <a:ext uri="{FF2B5EF4-FFF2-40B4-BE49-F238E27FC236}">
-                <a16:creationId xmlns:a16="http://schemas.microsoft.com/office/drawing/2014/main" id="{C2985B51-A76F-45DE-B4E5-EA6EE4942F25}"/>
+                <a16:creationId xmlns:a16="http://schemas.microsoft.com/office/drawing/2014/main" id="{0842993E-8ED9-4908-AE2B-8972319A91FB}"/>
               </a:ext>
             </a:extLst>
           </p:cNvPr>
@@ -6999,7 +6999,7 @@
           <p:cNvPr id="5" name="Rectangle 4">
             <a:extLst>
               <a:ext uri="{FF2B5EF4-FFF2-40B4-BE49-F238E27FC236}">
-                <a16:creationId xmlns:a16="http://schemas.microsoft.com/office/drawing/2014/main" id="{24EF03CF-54F1-4046-ADCE-D2D8412128E9}"/>
+                <a16:creationId xmlns:a16="http://schemas.microsoft.com/office/drawing/2014/main" id="{3FBB80D6-90BF-4746-8F70-AE6789E2497A}"/>
               </a:ext>
             </a:extLst>
           </p:cNvPr>
@@ -7053,7 +7053,7 @@
           <p:cNvPr id="6" name="Straight Arrow Connector 5">
             <a:extLst>
               <a:ext uri="{FF2B5EF4-FFF2-40B4-BE49-F238E27FC236}">
-                <a16:creationId xmlns:a16="http://schemas.microsoft.com/office/drawing/2014/main" id="{62FB96DF-BFA1-4D3C-BB90-B565140433C5}"/>
+                <a16:creationId xmlns:a16="http://schemas.microsoft.com/office/drawing/2014/main" id="{51D71E1E-A736-43D3-8CE4-CADB0F886348}"/>
               </a:ext>
             </a:extLst>
           </p:cNvPr>
@@ -7095,7 +7095,7 @@
           <p:cNvPr id="7" name="TextBox 6">
             <a:extLst>
               <a:ext uri="{FF2B5EF4-FFF2-40B4-BE49-F238E27FC236}">
-                <a16:creationId xmlns:a16="http://schemas.microsoft.com/office/drawing/2014/main" id="{F6ED906D-91C3-4AC8-8A5F-B02E4F1AC944}"/>
+                <a16:creationId xmlns:a16="http://schemas.microsoft.com/office/drawing/2014/main" id="{219D70A3-4067-4742-AB44-A958CD1F5852}"/>
               </a:ext>
             </a:extLst>
           </p:cNvPr>
@@ -7154,7 +7154,7 @@
     </p:spTree>
     <p:extLst>
       <p:ext uri="{BB962C8B-B14F-4D97-AF65-F5344CB8AC3E}">
-        <p14:creationId xmlns:p14="http://schemas.microsoft.com/office/powerpoint/2010/main" val="2882212468"/>
+        <p14:creationId xmlns:p14="http://schemas.microsoft.com/office/powerpoint/2010/main" val="1495859559"/>
       </p:ext>
     </p:extLst>
   </p:cSld>
@@ -7251,7 +7251,7 @@
         <p:spPr>
           <a:xfrm>
             <a:off x="3081044" y="4502647"/>
-            <a:ext cx="6029906" cy="2090151"/>
+            <a:ext cx="6025896" cy="2088761"/>
           </a:xfrm>
           <a:prstGeom prst="rect">
             <a:avLst/>
@@ -7265,10 +7265,10 @@
       </p:pic>
       <p:pic>
         <p:nvPicPr>
-          <p:cNvPr id="12" name="Picture 11">
+          <p:cNvPr id="3" name="Picture 2">
             <a:extLst>
               <a:ext uri="{FF2B5EF4-FFF2-40B4-BE49-F238E27FC236}">
-                <a16:creationId xmlns:a16="http://schemas.microsoft.com/office/drawing/2014/main" id="{FE204B01-6DC5-40C7-B3C8-10D5C0534F1F}"/>
+                <a16:creationId xmlns:a16="http://schemas.microsoft.com/office/drawing/2014/main" id="{44397019-ABBA-4D55-AEDC-8F28C3821B65}"/>
               </a:ext>
             </a:extLst>
           </p:cNvPr>
@@ -7291,17 +7291,12 @@
         </p:blipFill>
         <p:spPr>
           <a:xfrm>
-            <a:off x="3081045" y="2351334"/>
-            <a:ext cx="6029907" cy="2108281"/>
+            <a:off x="3037501" y="2324180"/>
+            <a:ext cx="6126480" cy="2134627"/>
           </a:xfrm>
           <a:prstGeom prst="rect">
             <a:avLst/>
           </a:prstGeom>
-          <a:ln w="12700">
-            <a:solidFill>
-              <a:schemeClr val="tx1"/>
-            </a:solidFill>
-          </a:ln>
         </p:spPr>
       </p:pic>
     </p:spTree>

</xml_diff>